<commit_message>
almost done, some bugs to solve
</commit_message>
<xml_diff>
--- a/03.5.Collection-project/assets/other/Plants catalogue.pptx
+++ b/03.5.Collection-project/assets/other/Plants catalogue.pptx
@@ -273,7 +273,7 @@
           <a:p>
             <a:fld id="{62744198-8B2D-44B3-8161-336AD7B76EF8}" type="datetimeFigureOut">
               <a:rPr lang="fr-FR" smtClean="0"/>
-              <a:t>12/06/2023</a:t>
+              <a:t>13/06/2023</a:t>
             </a:fld>
             <a:endParaRPr lang="fr-FR"/>
           </a:p>
@@ -471,7 +471,7 @@
           <a:p>
             <a:fld id="{62744198-8B2D-44B3-8161-336AD7B76EF8}" type="datetimeFigureOut">
               <a:rPr lang="fr-FR" smtClean="0"/>
-              <a:t>12/06/2023</a:t>
+              <a:t>13/06/2023</a:t>
             </a:fld>
             <a:endParaRPr lang="fr-FR"/>
           </a:p>
@@ -679,7 +679,7 @@
           <a:p>
             <a:fld id="{62744198-8B2D-44B3-8161-336AD7B76EF8}" type="datetimeFigureOut">
               <a:rPr lang="fr-FR" smtClean="0"/>
-              <a:t>12/06/2023</a:t>
+              <a:t>13/06/2023</a:t>
             </a:fld>
             <a:endParaRPr lang="fr-FR"/>
           </a:p>
@@ -877,7 +877,7 @@
           <a:p>
             <a:fld id="{62744198-8B2D-44B3-8161-336AD7B76EF8}" type="datetimeFigureOut">
               <a:rPr lang="fr-FR" smtClean="0"/>
-              <a:t>12/06/2023</a:t>
+              <a:t>13/06/2023</a:t>
             </a:fld>
             <a:endParaRPr lang="fr-FR"/>
           </a:p>
@@ -1152,7 +1152,7 @@
           <a:p>
             <a:fld id="{62744198-8B2D-44B3-8161-336AD7B76EF8}" type="datetimeFigureOut">
               <a:rPr lang="fr-FR" smtClean="0"/>
-              <a:t>12/06/2023</a:t>
+              <a:t>13/06/2023</a:t>
             </a:fld>
             <a:endParaRPr lang="fr-FR"/>
           </a:p>
@@ -1417,7 +1417,7 @@
           <a:p>
             <a:fld id="{62744198-8B2D-44B3-8161-336AD7B76EF8}" type="datetimeFigureOut">
               <a:rPr lang="fr-FR" smtClean="0"/>
-              <a:t>12/06/2023</a:t>
+              <a:t>13/06/2023</a:t>
             </a:fld>
             <a:endParaRPr lang="fr-FR"/>
           </a:p>
@@ -1829,7 +1829,7 @@
           <a:p>
             <a:fld id="{62744198-8B2D-44B3-8161-336AD7B76EF8}" type="datetimeFigureOut">
               <a:rPr lang="fr-FR" smtClean="0"/>
-              <a:t>12/06/2023</a:t>
+              <a:t>13/06/2023</a:t>
             </a:fld>
             <a:endParaRPr lang="fr-FR"/>
           </a:p>
@@ -1970,7 +1970,7 @@
           <a:p>
             <a:fld id="{62744198-8B2D-44B3-8161-336AD7B76EF8}" type="datetimeFigureOut">
               <a:rPr lang="fr-FR" smtClean="0"/>
-              <a:t>12/06/2023</a:t>
+              <a:t>13/06/2023</a:t>
             </a:fld>
             <a:endParaRPr lang="fr-FR"/>
           </a:p>
@@ -2083,7 +2083,7 @@
           <a:p>
             <a:fld id="{62744198-8B2D-44B3-8161-336AD7B76EF8}" type="datetimeFigureOut">
               <a:rPr lang="fr-FR" smtClean="0"/>
-              <a:t>12/06/2023</a:t>
+              <a:t>13/06/2023</a:t>
             </a:fld>
             <a:endParaRPr lang="fr-FR"/>
           </a:p>
@@ -2394,7 +2394,7 @@
           <a:p>
             <a:fld id="{62744198-8B2D-44B3-8161-336AD7B76EF8}" type="datetimeFigureOut">
               <a:rPr lang="fr-FR" smtClean="0"/>
-              <a:t>12/06/2023</a:t>
+              <a:t>13/06/2023</a:t>
             </a:fld>
             <a:endParaRPr lang="fr-FR"/>
           </a:p>
@@ -2682,7 +2682,7 @@
           <a:p>
             <a:fld id="{62744198-8B2D-44B3-8161-336AD7B76EF8}" type="datetimeFigureOut">
               <a:rPr lang="fr-FR" smtClean="0"/>
-              <a:t>12/06/2023</a:t>
+              <a:t>13/06/2023</a:t>
             </a:fld>
             <a:endParaRPr lang="fr-FR"/>
           </a:p>
@@ -2923,7 +2923,7 @@
           <a:p>
             <a:fld id="{62744198-8B2D-44B3-8161-336AD7B76EF8}" type="datetimeFigureOut">
               <a:rPr lang="fr-FR" smtClean="0"/>
-              <a:t>12/06/2023</a:t>
+              <a:t>13/06/2023</a:t>
             </a:fld>
             <a:endParaRPr lang="fr-FR"/>
           </a:p>
@@ -3680,8 +3680,8 @@
         </p:nvSpPr>
         <p:spPr>
           <a:xfrm>
-            <a:off x="4602040" y="1274884"/>
-            <a:ext cx="3138854" cy="4044461"/>
+            <a:off x="4411209" y="1186025"/>
+            <a:ext cx="3138854" cy="4923693"/>
           </a:xfrm>
           <a:prstGeom prst="rect">
             <a:avLst/>
@@ -3717,7 +3717,7 @@
           <a:lstStyle/>
           <a:p>
             <a:pPr algn="ctr"/>
-            <a:endParaRPr lang="fr-FR"/>
+            <a:endParaRPr lang="fr-FR" dirty="0"/>
           </a:p>
         </p:txBody>
       </p:sp>
@@ -3887,7 +3887,7 @@
         </p:nvSpPr>
         <p:spPr>
           <a:xfrm>
-            <a:off x="747346" y="4457700"/>
+            <a:off x="4835769" y="1661746"/>
             <a:ext cx="1734770" cy="369332"/>
           </a:xfrm>
           <a:prstGeom prst="rect">
@@ -4161,6 +4161,859 @@
           </a:prstGeom>
         </p:spPr>
       </p:pic>
+      <p:cxnSp>
+        <p:nvCxnSpPr>
+          <p:cNvPr id="10" name="Connecteur droit 9">
+            <a:extLst>
+              <a:ext uri="{FF2B5EF4-FFF2-40B4-BE49-F238E27FC236}">
+                <a16:creationId xmlns:a16="http://schemas.microsoft.com/office/drawing/2014/main" id="{D363E88D-29EE-DBD6-9531-D8D72F50E08E}"/>
+              </a:ext>
+            </a:extLst>
+          </p:cNvPr>
+          <p:cNvCxnSpPr/>
+          <p:nvPr/>
+        </p:nvCxnSpPr>
+        <p:spPr>
+          <a:xfrm>
+            <a:off x="4835769" y="1582615"/>
+            <a:ext cx="1591407" cy="0"/>
+          </a:xfrm>
+          <a:prstGeom prst="line">
+            <a:avLst/>
+          </a:prstGeom>
+          <a:ln w="19050">
+            <a:solidFill>
+              <a:schemeClr val="tx1"/>
+            </a:solidFill>
+          </a:ln>
+        </p:spPr>
+        <p:style>
+          <a:lnRef idx="1">
+            <a:schemeClr val="accent1"/>
+          </a:lnRef>
+          <a:fillRef idx="0">
+            <a:schemeClr val="accent1"/>
+          </a:fillRef>
+          <a:effectRef idx="0">
+            <a:schemeClr val="accent1"/>
+          </a:effectRef>
+          <a:fontRef idx="minor">
+            <a:schemeClr val="tx1"/>
+          </a:fontRef>
+        </p:style>
+      </p:cxnSp>
+      <p:sp>
+        <p:nvSpPr>
+          <p:cNvPr id="12" name="Rectangle : coins arrondis 11">
+            <a:extLst>
+              <a:ext uri="{FF2B5EF4-FFF2-40B4-BE49-F238E27FC236}">
+                <a16:creationId xmlns:a16="http://schemas.microsoft.com/office/drawing/2014/main" id="{1C7CB88C-796C-2825-0DB6-5B155BC41137}"/>
+              </a:ext>
+            </a:extLst>
+          </p:cNvPr>
+          <p:cNvSpPr/>
+          <p:nvPr/>
+        </p:nvSpPr>
+        <p:spPr>
+          <a:xfrm>
+            <a:off x="4637803" y="1406769"/>
+            <a:ext cx="2132274" cy="764931"/>
+          </a:xfrm>
+          <a:prstGeom prst="roundRect">
+            <a:avLst/>
+          </a:prstGeom>
+          <a:noFill/>
+          <a:ln>
+            <a:solidFill>
+              <a:srgbClr val="FF0000"/>
+            </a:solidFill>
+          </a:ln>
+        </p:spPr>
+        <p:style>
+          <a:lnRef idx="2">
+            <a:schemeClr val="accent1">
+              <a:shade val="15000"/>
+            </a:schemeClr>
+          </a:lnRef>
+          <a:fillRef idx="1">
+            <a:schemeClr val="accent1"/>
+          </a:fillRef>
+          <a:effectRef idx="0">
+            <a:schemeClr val="accent1"/>
+          </a:effectRef>
+          <a:fontRef idx="minor">
+            <a:schemeClr val="lt1"/>
+          </a:fontRef>
+        </p:style>
+        <p:txBody>
+          <a:bodyPr rtlCol="0" anchor="ctr"/>
+          <a:lstStyle/>
+          <a:p>
+            <a:pPr algn="ctr"/>
+            <a:endParaRPr lang="fr-FR"/>
+          </a:p>
+        </p:txBody>
+      </p:sp>
+      <p:sp>
+        <p:nvSpPr>
+          <p:cNvPr id="16" name="ZoneTexte 15">
+            <a:extLst>
+              <a:ext uri="{FF2B5EF4-FFF2-40B4-BE49-F238E27FC236}">
+                <a16:creationId xmlns:a16="http://schemas.microsoft.com/office/drawing/2014/main" id="{99EEE015-DFED-8857-E81A-21FC8CB4AD29}"/>
+              </a:ext>
+            </a:extLst>
+          </p:cNvPr>
+          <p:cNvSpPr txBox="1"/>
+          <p:nvPr/>
+        </p:nvSpPr>
+        <p:spPr>
+          <a:xfrm>
+            <a:off x="5749510" y="1134216"/>
+            <a:ext cx="1539845" cy="307777"/>
+          </a:xfrm>
+          <a:prstGeom prst="rect">
+            <a:avLst/>
+          </a:prstGeom>
+          <a:noFill/>
+        </p:spPr>
+        <p:txBody>
+          <a:bodyPr wrap="none" rtlCol="0">
+            <a:spAutoFit/>
+          </a:bodyPr>
+          <a:lstStyle/>
+          <a:p>
+            <a:r>
+              <a:rPr lang="fr-FR" sz="1400" dirty="0" err="1">
+                <a:solidFill>
+                  <a:srgbClr val="FF0000"/>
+                </a:solidFill>
+              </a:rPr>
+              <a:t>newDivPlantName</a:t>
+            </a:r>
+            <a:endParaRPr lang="fr-FR" sz="1400" dirty="0">
+              <a:solidFill>
+                <a:srgbClr val="FF0000"/>
+              </a:solidFill>
+            </a:endParaRPr>
+          </a:p>
+        </p:txBody>
+      </p:sp>
+      <p:sp>
+        <p:nvSpPr>
+          <p:cNvPr id="18" name="ZoneTexte 17">
+            <a:extLst>
+              <a:ext uri="{FF2B5EF4-FFF2-40B4-BE49-F238E27FC236}">
+                <a16:creationId xmlns:a16="http://schemas.microsoft.com/office/drawing/2014/main" id="{41CCBFFE-1820-5A9E-A6E2-224A978772E4}"/>
+              </a:ext>
+            </a:extLst>
+          </p:cNvPr>
+          <p:cNvSpPr txBox="1"/>
+          <p:nvPr/>
+        </p:nvSpPr>
+        <p:spPr>
+          <a:xfrm>
+            <a:off x="4310437" y="914386"/>
+            <a:ext cx="833754" cy="307777"/>
+          </a:xfrm>
+          <a:prstGeom prst="rect">
+            <a:avLst/>
+          </a:prstGeom>
+          <a:noFill/>
+          <a:ln>
+            <a:noFill/>
+          </a:ln>
+        </p:spPr>
+        <p:txBody>
+          <a:bodyPr wrap="none" rtlCol="0">
+            <a:spAutoFit/>
+          </a:bodyPr>
+          <a:lstStyle/>
+          <a:p>
+            <a:r>
+              <a:rPr lang="fr-FR" sz="1400" dirty="0" err="1">
+                <a:solidFill>
+                  <a:schemeClr val="accent4">
+                    <a:lumMod val="60000"/>
+                    <a:lumOff val="40000"/>
+                  </a:schemeClr>
+                </a:solidFill>
+              </a:rPr>
+              <a:t>newCard</a:t>
+            </a:r>
+            <a:endParaRPr lang="fr-FR" sz="1400" dirty="0">
+              <a:solidFill>
+                <a:schemeClr val="accent4">
+                  <a:lumMod val="60000"/>
+                  <a:lumOff val="40000"/>
+                </a:schemeClr>
+              </a:solidFill>
+            </a:endParaRPr>
+          </a:p>
+        </p:txBody>
+      </p:sp>
+      <p:sp>
+        <p:nvSpPr>
+          <p:cNvPr id="20" name="ZoneTexte 19">
+            <a:extLst>
+              <a:ext uri="{FF2B5EF4-FFF2-40B4-BE49-F238E27FC236}">
+                <a16:creationId xmlns:a16="http://schemas.microsoft.com/office/drawing/2014/main" id="{54D4A6B5-9410-4CCA-6652-EDC7EC635C1D}"/>
+              </a:ext>
+            </a:extLst>
+          </p:cNvPr>
+          <p:cNvSpPr txBox="1"/>
+          <p:nvPr/>
+        </p:nvSpPr>
+        <p:spPr>
+          <a:xfrm>
+            <a:off x="4637803" y="2564940"/>
+            <a:ext cx="1551835" cy="369332"/>
+          </a:xfrm>
+          <a:prstGeom prst="rect">
+            <a:avLst/>
+          </a:prstGeom>
+          <a:noFill/>
+        </p:spPr>
+        <p:txBody>
+          <a:bodyPr wrap="none" rtlCol="0">
+            <a:spAutoFit/>
+          </a:bodyPr>
+          <a:lstStyle/>
+          <a:p>
+            <a:r>
+              <a:rPr lang="fr-FR" dirty="0" err="1"/>
+              <a:t>Characteristics</a:t>
+            </a:r>
+            <a:endParaRPr lang="fr-FR" dirty="0"/>
+          </a:p>
+        </p:txBody>
+      </p:sp>
+      <p:pic>
+        <p:nvPicPr>
+          <p:cNvPr id="21" name="Image 20">
+            <a:extLst>
+              <a:ext uri="{FF2B5EF4-FFF2-40B4-BE49-F238E27FC236}">
+                <a16:creationId xmlns:a16="http://schemas.microsoft.com/office/drawing/2014/main" id="{25A67C64-2FB6-E5C6-8BDD-130A644DD05D}"/>
+              </a:ext>
+            </a:extLst>
+          </p:cNvPr>
+          <p:cNvPicPr>
+            <a:picLocks noChangeAspect="1"/>
+          </p:cNvPicPr>
+          <p:nvPr/>
+        </p:nvPicPr>
+        <p:blipFill>
+          <a:blip r:embed="rId3">
+            <a:extLst>
+              <a:ext uri="{28A0092B-C50C-407E-A947-70E740481C1C}">
+                <a14:useLocalDpi xmlns:a14="http://schemas.microsoft.com/office/drawing/2010/main" val="0"/>
+              </a:ext>
+            </a:extLst>
+          </a:blip>
+          <a:stretch>
+            <a:fillRect/>
+          </a:stretch>
+        </p:blipFill>
+        <p:spPr>
+          <a:xfrm>
+            <a:off x="4802788" y="3448837"/>
+            <a:ext cx="353099" cy="353099"/>
+          </a:xfrm>
+          <a:prstGeom prst="rect">
+            <a:avLst/>
+          </a:prstGeom>
+        </p:spPr>
+      </p:pic>
+      <p:pic>
+        <p:nvPicPr>
+          <p:cNvPr id="24" name="Image 23">
+            <a:extLst>
+              <a:ext uri="{FF2B5EF4-FFF2-40B4-BE49-F238E27FC236}">
+                <a16:creationId xmlns:a16="http://schemas.microsoft.com/office/drawing/2014/main" id="{DED22445-AE54-3A78-79BD-F91D7B959CCC}"/>
+              </a:ext>
+            </a:extLst>
+          </p:cNvPr>
+          <p:cNvPicPr>
+            <a:picLocks noChangeAspect="1"/>
+          </p:cNvPicPr>
+          <p:nvPr/>
+        </p:nvPicPr>
+        <p:blipFill>
+          <a:blip r:embed="rId6">
+            <a:extLst>
+              <a:ext uri="{28A0092B-C50C-407E-A947-70E740481C1C}">
+                <a14:useLocalDpi xmlns:a14="http://schemas.microsoft.com/office/drawing/2010/main" val="0"/>
+              </a:ext>
+            </a:extLst>
+          </a:blip>
+          <a:stretch>
+            <a:fillRect/>
+          </a:stretch>
+        </p:blipFill>
+        <p:spPr>
+          <a:xfrm>
+            <a:off x="6208850" y="3516723"/>
+            <a:ext cx="467286" cy="467286"/>
+          </a:xfrm>
+          <a:prstGeom prst="rect">
+            <a:avLst/>
+          </a:prstGeom>
+        </p:spPr>
+      </p:pic>
+      <p:pic>
+        <p:nvPicPr>
+          <p:cNvPr id="25" name="Image 24">
+            <a:extLst>
+              <a:ext uri="{FF2B5EF4-FFF2-40B4-BE49-F238E27FC236}">
+                <a16:creationId xmlns:a16="http://schemas.microsoft.com/office/drawing/2014/main" id="{4008DAB8-DFF1-3DD1-BA9B-491F16DB65F0}"/>
+              </a:ext>
+            </a:extLst>
+          </p:cNvPr>
+          <p:cNvPicPr>
+            <a:picLocks noChangeAspect="1"/>
+          </p:cNvPicPr>
+          <p:nvPr/>
+        </p:nvPicPr>
+        <p:blipFill>
+          <a:blip r:embed="rId4">
+            <a:extLst>
+              <a:ext uri="{28A0092B-C50C-407E-A947-70E740481C1C}">
+                <a14:useLocalDpi xmlns:a14="http://schemas.microsoft.com/office/drawing/2010/main" val="0"/>
+              </a:ext>
+            </a:extLst>
+          </a:blip>
+          <a:stretch>
+            <a:fillRect/>
+          </a:stretch>
+        </p:blipFill>
+        <p:spPr>
+          <a:xfrm>
+            <a:off x="4795441" y="4681710"/>
+            <a:ext cx="467286" cy="467286"/>
+          </a:xfrm>
+          <a:prstGeom prst="rect">
+            <a:avLst/>
+          </a:prstGeom>
+        </p:spPr>
+      </p:pic>
+      <p:pic>
+        <p:nvPicPr>
+          <p:cNvPr id="26" name="Image 25">
+            <a:extLst>
+              <a:ext uri="{FF2B5EF4-FFF2-40B4-BE49-F238E27FC236}">
+                <a16:creationId xmlns:a16="http://schemas.microsoft.com/office/drawing/2014/main" id="{9B099A77-E05E-0D12-B302-40F55C57C87D}"/>
+              </a:ext>
+            </a:extLst>
+          </p:cNvPr>
+          <p:cNvPicPr>
+            <a:picLocks noChangeAspect="1"/>
+          </p:cNvPicPr>
+          <p:nvPr/>
+        </p:nvPicPr>
+        <p:blipFill>
+          <a:blip r:embed="rId5">
+            <a:extLst>
+              <a:ext uri="{28A0092B-C50C-407E-A947-70E740481C1C}">
+                <a14:useLocalDpi xmlns:a14="http://schemas.microsoft.com/office/drawing/2010/main" val="0"/>
+              </a:ext>
+            </a:extLst>
+          </a:blip>
+          <a:stretch>
+            <a:fillRect/>
+          </a:stretch>
+        </p:blipFill>
+        <p:spPr>
+          <a:xfrm>
+            <a:off x="6243321" y="4701089"/>
+            <a:ext cx="467287" cy="467287"/>
+          </a:xfrm>
+          <a:prstGeom prst="rect">
+            <a:avLst/>
+          </a:prstGeom>
+        </p:spPr>
+      </p:pic>
+      <p:sp>
+        <p:nvSpPr>
+          <p:cNvPr id="27" name="Rectangle : coins arrondis 26">
+            <a:extLst>
+              <a:ext uri="{FF2B5EF4-FFF2-40B4-BE49-F238E27FC236}">
+                <a16:creationId xmlns:a16="http://schemas.microsoft.com/office/drawing/2014/main" id="{7E2059BF-C343-9A92-7FCD-744364FDFD41}"/>
+              </a:ext>
+            </a:extLst>
+          </p:cNvPr>
+          <p:cNvSpPr/>
+          <p:nvPr/>
+        </p:nvSpPr>
+        <p:spPr>
+          <a:xfrm>
+            <a:off x="4562758" y="2461446"/>
+            <a:ext cx="2471088" cy="2110554"/>
+          </a:xfrm>
+          <a:prstGeom prst="roundRect">
+            <a:avLst/>
+          </a:prstGeom>
+          <a:noFill/>
+          <a:ln>
+            <a:solidFill>
+              <a:srgbClr val="FF0000"/>
+            </a:solidFill>
+          </a:ln>
+        </p:spPr>
+        <p:style>
+          <a:lnRef idx="2">
+            <a:schemeClr val="accent1">
+              <a:shade val="15000"/>
+            </a:schemeClr>
+          </a:lnRef>
+          <a:fillRef idx="1">
+            <a:schemeClr val="accent1"/>
+          </a:fillRef>
+          <a:effectRef idx="0">
+            <a:schemeClr val="accent1"/>
+          </a:effectRef>
+          <a:fontRef idx="minor">
+            <a:schemeClr val="lt1"/>
+          </a:fontRef>
+        </p:style>
+        <p:txBody>
+          <a:bodyPr rtlCol="0" anchor="ctr"/>
+          <a:lstStyle/>
+          <a:p>
+            <a:pPr algn="ctr"/>
+            <a:endParaRPr lang="fr-FR"/>
+          </a:p>
+        </p:txBody>
+      </p:sp>
+      <p:sp>
+        <p:nvSpPr>
+          <p:cNvPr id="28" name="ZoneTexte 27">
+            <a:extLst>
+              <a:ext uri="{FF2B5EF4-FFF2-40B4-BE49-F238E27FC236}">
+                <a16:creationId xmlns:a16="http://schemas.microsoft.com/office/drawing/2014/main" id="{EAC79A50-9AEA-4396-9D11-A4A1FE9D5FD6}"/>
+              </a:ext>
+            </a:extLst>
+          </p:cNvPr>
+          <p:cNvSpPr txBox="1"/>
+          <p:nvPr/>
+        </p:nvSpPr>
+        <p:spPr>
+          <a:xfrm>
+            <a:off x="6380840" y="2180705"/>
+            <a:ext cx="607410" cy="307777"/>
+          </a:xfrm>
+          <a:prstGeom prst="rect">
+            <a:avLst/>
+          </a:prstGeom>
+          <a:noFill/>
+        </p:spPr>
+        <p:txBody>
+          <a:bodyPr wrap="none" rtlCol="0">
+            <a:spAutoFit/>
+          </a:bodyPr>
+          <a:lstStyle/>
+          <a:p>
+            <a:r>
+              <a:rPr lang="fr-FR" sz="1400" dirty="0">
+                <a:solidFill>
+                  <a:srgbClr val="FF0000"/>
+                </a:solidFill>
+              </a:rPr>
+              <a:t>Chara</a:t>
+            </a:r>
+          </a:p>
+        </p:txBody>
+      </p:sp>
+      <p:sp>
+        <p:nvSpPr>
+          <p:cNvPr id="29" name="Rectangle : coins arrondis 28">
+            <a:extLst>
+              <a:ext uri="{FF2B5EF4-FFF2-40B4-BE49-F238E27FC236}">
+                <a16:creationId xmlns:a16="http://schemas.microsoft.com/office/drawing/2014/main" id="{C954272D-4000-CCC2-84E0-81C79682DBDF}"/>
+              </a:ext>
+            </a:extLst>
+          </p:cNvPr>
+          <p:cNvSpPr/>
+          <p:nvPr/>
+        </p:nvSpPr>
+        <p:spPr>
+          <a:xfrm>
+            <a:off x="4659644" y="2540291"/>
+            <a:ext cx="1529994" cy="482051"/>
+          </a:xfrm>
+          <a:prstGeom prst="roundRect">
+            <a:avLst/>
+          </a:prstGeom>
+          <a:noFill/>
+          <a:ln>
+            <a:solidFill>
+              <a:schemeClr val="accent1">
+                <a:lumMod val="75000"/>
+              </a:schemeClr>
+            </a:solidFill>
+          </a:ln>
+        </p:spPr>
+        <p:style>
+          <a:lnRef idx="2">
+            <a:schemeClr val="accent1">
+              <a:shade val="15000"/>
+            </a:schemeClr>
+          </a:lnRef>
+          <a:fillRef idx="1">
+            <a:schemeClr val="accent1"/>
+          </a:fillRef>
+          <a:effectRef idx="0">
+            <a:schemeClr val="accent1"/>
+          </a:effectRef>
+          <a:fontRef idx="minor">
+            <a:schemeClr val="lt1"/>
+          </a:fontRef>
+        </p:style>
+        <p:txBody>
+          <a:bodyPr rtlCol="0" anchor="ctr"/>
+          <a:lstStyle/>
+          <a:p>
+            <a:pPr algn="ctr"/>
+            <a:endParaRPr lang="fr-FR"/>
+          </a:p>
+        </p:txBody>
+      </p:sp>
+      <p:sp>
+        <p:nvSpPr>
+          <p:cNvPr id="30" name="ZoneTexte 29">
+            <a:extLst>
+              <a:ext uri="{FF2B5EF4-FFF2-40B4-BE49-F238E27FC236}">
+                <a16:creationId xmlns:a16="http://schemas.microsoft.com/office/drawing/2014/main" id="{0E986490-C2DA-4354-6889-1913568FE238}"/>
+              </a:ext>
+            </a:extLst>
+          </p:cNvPr>
+          <p:cNvSpPr txBox="1"/>
+          <p:nvPr/>
+        </p:nvSpPr>
+        <p:spPr>
+          <a:xfrm>
+            <a:off x="4735387" y="4128408"/>
+            <a:ext cx="840999" cy="307777"/>
+          </a:xfrm>
+          <a:prstGeom prst="rect">
+            <a:avLst/>
+          </a:prstGeom>
+          <a:noFill/>
+        </p:spPr>
+        <p:txBody>
+          <a:bodyPr wrap="none" rtlCol="0">
+            <a:spAutoFit/>
+          </a:bodyPr>
+          <a:lstStyle/>
+          <a:p>
+            <a:r>
+              <a:rPr lang="fr-FR" sz="1400" dirty="0" err="1">
+                <a:solidFill>
+                  <a:srgbClr val="E53BA4"/>
+                </a:solidFill>
+              </a:rPr>
+              <a:t>plantSize</a:t>
+            </a:r>
+            <a:endParaRPr lang="fr-FR" sz="1400" dirty="0">
+              <a:solidFill>
+                <a:srgbClr val="E53BA4"/>
+              </a:solidFill>
+            </a:endParaRPr>
+          </a:p>
+        </p:txBody>
+      </p:sp>
+      <p:sp>
+        <p:nvSpPr>
+          <p:cNvPr id="31" name="Rectangle : coins arrondis 30">
+            <a:extLst>
+              <a:ext uri="{FF2B5EF4-FFF2-40B4-BE49-F238E27FC236}">
+                <a16:creationId xmlns:a16="http://schemas.microsoft.com/office/drawing/2014/main" id="{9D899A40-EDF8-99F4-A441-9D31839EB942}"/>
+              </a:ext>
+            </a:extLst>
+          </p:cNvPr>
+          <p:cNvSpPr/>
+          <p:nvPr/>
+        </p:nvSpPr>
+        <p:spPr>
+          <a:xfrm>
+            <a:off x="4659644" y="3147645"/>
+            <a:ext cx="2328606" cy="1319035"/>
+          </a:xfrm>
+          <a:prstGeom prst="roundRect">
+            <a:avLst/>
+          </a:prstGeom>
+          <a:noFill/>
+          <a:ln>
+            <a:solidFill>
+              <a:srgbClr val="00B050"/>
+            </a:solidFill>
+          </a:ln>
+        </p:spPr>
+        <p:style>
+          <a:lnRef idx="2">
+            <a:schemeClr val="accent1">
+              <a:shade val="15000"/>
+            </a:schemeClr>
+          </a:lnRef>
+          <a:fillRef idx="1">
+            <a:schemeClr val="accent1"/>
+          </a:fillRef>
+          <a:effectRef idx="0">
+            <a:schemeClr val="accent1"/>
+          </a:effectRef>
+          <a:fontRef idx="minor">
+            <a:schemeClr val="lt1"/>
+          </a:fontRef>
+        </p:style>
+        <p:txBody>
+          <a:bodyPr rtlCol="0" anchor="ctr"/>
+          <a:lstStyle/>
+          <a:p>
+            <a:pPr algn="ctr"/>
+            <a:endParaRPr lang="fr-FR"/>
+          </a:p>
+        </p:txBody>
+      </p:sp>
+      <p:sp>
+        <p:nvSpPr>
+          <p:cNvPr id="32" name="ZoneTexte 31">
+            <a:extLst>
+              <a:ext uri="{FF2B5EF4-FFF2-40B4-BE49-F238E27FC236}">
+                <a16:creationId xmlns:a16="http://schemas.microsoft.com/office/drawing/2014/main" id="{FC17DA88-8AC0-718B-B55C-AB83CD2E04A1}"/>
+              </a:ext>
+            </a:extLst>
+          </p:cNvPr>
+          <p:cNvSpPr txBox="1"/>
+          <p:nvPr/>
+        </p:nvSpPr>
+        <p:spPr>
+          <a:xfrm>
+            <a:off x="5225976" y="3139451"/>
+            <a:ext cx="1146019" cy="307777"/>
+          </a:xfrm>
+          <a:prstGeom prst="rect">
+            <a:avLst/>
+          </a:prstGeom>
+          <a:noFill/>
+        </p:spPr>
+        <p:txBody>
+          <a:bodyPr wrap="none" rtlCol="0">
+            <a:spAutoFit/>
+          </a:bodyPr>
+          <a:lstStyle/>
+          <a:p>
+            <a:r>
+              <a:rPr lang="fr-FR" sz="1400" dirty="0" err="1">
+                <a:solidFill>
+                  <a:srgbClr val="00B050"/>
+                </a:solidFill>
+              </a:rPr>
+              <a:t>CharaSection</a:t>
+            </a:r>
+            <a:endParaRPr lang="fr-FR" sz="1400" dirty="0">
+              <a:solidFill>
+                <a:srgbClr val="00B050"/>
+              </a:solidFill>
+            </a:endParaRPr>
+          </a:p>
+        </p:txBody>
+      </p:sp>
+      <p:sp>
+        <p:nvSpPr>
+          <p:cNvPr id="33" name="Rectangle : coins arrondis 32">
+            <a:extLst>
+              <a:ext uri="{FF2B5EF4-FFF2-40B4-BE49-F238E27FC236}">
+                <a16:creationId xmlns:a16="http://schemas.microsoft.com/office/drawing/2014/main" id="{913F0AFE-0A26-FE68-997B-AAF3940D25C3}"/>
+              </a:ext>
+            </a:extLst>
+          </p:cNvPr>
+          <p:cNvSpPr/>
+          <p:nvPr/>
+        </p:nvSpPr>
+        <p:spPr>
+          <a:xfrm>
+            <a:off x="4722410" y="3375939"/>
+            <a:ext cx="1027099" cy="757488"/>
+          </a:xfrm>
+          <a:prstGeom prst="roundRect">
+            <a:avLst/>
+          </a:prstGeom>
+          <a:noFill/>
+          <a:ln>
+            <a:solidFill>
+              <a:srgbClr val="E53BA4"/>
+            </a:solidFill>
+          </a:ln>
+        </p:spPr>
+        <p:style>
+          <a:lnRef idx="2">
+            <a:schemeClr val="accent1">
+              <a:shade val="15000"/>
+            </a:schemeClr>
+          </a:lnRef>
+          <a:fillRef idx="1">
+            <a:schemeClr val="accent1"/>
+          </a:fillRef>
+          <a:effectRef idx="0">
+            <a:schemeClr val="accent1"/>
+          </a:effectRef>
+          <a:fontRef idx="minor">
+            <a:schemeClr val="lt1"/>
+          </a:fontRef>
+        </p:style>
+        <p:txBody>
+          <a:bodyPr rtlCol="0" anchor="ctr"/>
+          <a:lstStyle/>
+          <a:p>
+            <a:pPr algn="ctr"/>
+            <a:endParaRPr lang="fr-FR"/>
+          </a:p>
+        </p:txBody>
+      </p:sp>
+      <p:sp>
+        <p:nvSpPr>
+          <p:cNvPr id="34" name="ZoneTexte 33">
+            <a:extLst>
+              <a:ext uri="{FF2B5EF4-FFF2-40B4-BE49-F238E27FC236}">
+                <a16:creationId xmlns:a16="http://schemas.microsoft.com/office/drawing/2014/main" id="{BD8CE4F2-AB99-6C02-3D73-8F8EA6A55B7E}"/>
+              </a:ext>
+            </a:extLst>
+          </p:cNvPr>
+          <p:cNvSpPr txBox="1"/>
+          <p:nvPr/>
+        </p:nvSpPr>
+        <p:spPr>
+          <a:xfrm>
+            <a:off x="5204438" y="3447228"/>
+            <a:ext cx="476412" cy="369332"/>
+          </a:xfrm>
+          <a:prstGeom prst="rect">
+            <a:avLst/>
+          </a:prstGeom>
+          <a:noFill/>
+        </p:spPr>
+        <p:txBody>
+          <a:bodyPr wrap="none" rtlCol="0">
+            <a:spAutoFit/>
+          </a:bodyPr>
+          <a:lstStyle/>
+          <a:p>
+            <a:r>
+              <a:rPr lang="fr-FR" dirty="0"/>
+              <a:t>1,5</a:t>
+            </a:r>
+          </a:p>
+        </p:txBody>
+      </p:sp>
+      <p:sp>
+        <p:nvSpPr>
+          <p:cNvPr id="35" name="ZoneTexte 34">
+            <a:extLst>
+              <a:ext uri="{FF2B5EF4-FFF2-40B4-BE49-F238E27FC236}">
+                <a16:creationId xmlns:a16="http://schemas.microsoft.com/office/drawing/2014/main" id="{FE6C3F5F-799E-7AEE-9BF7-6492ECC32D65}"/>
+              </a:ext>
+            </a:extLst>
+          </p:cNvPr>
+          <p:cNvSpPr txBox="1"/>
+          <p:nvPr/>
+        </p:nvSpPr>
+        <p:spPr>
+          <a:xfrm>
+            <a:off x="4441249" y="3792924"/>
+            <a:ext cx="942887" cy="261610"/>
+          </a:xfrm>
+          <a:prstGeom prst="rect">
+            <a:avLst/>
+          </a:prstGeom>
+          <a:noFill/>
+        </p:spPr>
+        <p:txBody>
+          <a:bodyPr wrap="none" rtlCol="0">
+            <a:spAutoFit/>
+          </a:bodyPr>
+          <a:lstStyle/>
+          <a:p>
+            <a:r>
+              <a:rPr lang="fr-FR" sz="1050" dirty="0" err="1"/>
+              <a:t>plantSizeIcon</a:t>
+            </a:r>
+            <a:endParaRPr lang="fr-FR" sz="1050" dirty="0"/>
+          </a:p>
+        </p:txBody>
+      </p:sp>
+      <p:sp>
+        <p:nvSpPr>
+          <p:cNvPr id="36" name="ZoneTexte 35">
+            <a:extLst>
+              <a:ext uri="{FF2B5EF4-FFF2-40B4-BE49-F238E27FC236}">
+                <a16:creationId xmlns:a16="http://schemas.microsoft.com/office/drawing/2014/main" id="{ECDE2210-A40F-4422-8D48-52080DB9ED2B}"/>
+              </a:ext>
+            </a:extLst>
+          </p:cNvPr>
+          <p:cNvSpPr txBox="1"/>
+          <p:nvPr/>
+        </p:nvSpPr>
+        <p:spPr>
+          <a:xfrm>
+            <a:off x="5005663" y="3352385"/>
+            <a:ext cx="942887" cy="246221"/>
+          </a:xfrm>
+          <a:prstGeom prst="rect">
+            <a:avLst/>
+          </a:prstGeom>
+          <a:noFill/>
+        </p:spPr>
+        <p:txBody>
+          <a:bodyPr wrap="square" rtlCol="0">
+            <a:spAutoFit/>
+          </a:bodyPr>
+          <a:lstStyle/>
+          <a:p>
+            <a:r>
+              <a:rPr lang="fr-FR" sz="1000" dirty="0" err="1"/>
+              <a:t>plantSizeValue</a:t>
+            </a:r>
+            <a:endParaRPr lang="fr-FR" sz="1000" dirty="0"/>
+          </a:p>
+        </p:txBody>
+      </p:sp>
+      <p:sp>
+        <p:nvSpPr>
+          <p:cNvPr id="37" name="ZoneTexte 36">
+            <a:extLst>
+              <a:ext uri="{FF2B5EF4-FFF2-40B4-BE49-F238E27FC236}">
+                <a16:creationId xmlns:a16="http://schemas.microsoft.com/office/drawing/2014/main" id="{DF8682AC-D998-480F-DEFC-1DAA8688D10E}"/>
+              </a:ext>
+            </a:extLst>
+          </p:cNvPr>
+          <p:cNvSpPr txBox="1"/>
+          <p:nvPr/>
+        </p:nvSpPr>
+        <p:spPr>
+          <a:xfrm>
+            <a:off x="6165043" y="2619827"/>
+            <a:ext cx="810991" cy="307777"/>
+          </a:xfrm>
+          <a:prstGeom prst="rect">
+            <a:avLst/>
+          </a:prstGeom>
+          <a:noFill/>
+        </p:spPr>
+        <p:txBody>
+          <a:bodyPr wrap="none" rtlCol="0">
+            <a:spAutoFit/>
+          </a:bodyPr>
+          <a:lstStyle/>
+          <a:p>
+            <a:r>
+              <a:rPr lang="fr-FR" sz="1400" dirty="0">
+                <a:solidFill>
+                  <a:srgbClr val="0070C0"/>
+                </a:solidFill>
+              </a:rPr>
+              <a:t>CharaH5</a:t>
+            </a:r>
+          </a:p>
+        </p:txBody>
+      </p:sp>
     </p:spTree>
     <p:extLst>
       <p:ext uri="{BB962C8B-B14F-4D97-AF65-F5344CB8AC3E}">

</xml_diff>